<commit_message>
fix missing link on homepage and update some slides
</commit_message>
<xml_diff>
--- a/select_digital_methods/week11-12_distant_reading/Week 12. Text Analysis/SLIDES/DH - Lecture 16 Text Analysis.pptx
+++ b/select_digital_methods/week11-12_distant_reading/Week 12. Text Analysis/SLIDES/DH - Lecture 16 Text Analysis.pptx
@@ -5,7 +5,7 @@
     <p:sldMasterId id="2147483660" r:id="rId1"/>
   </p:sldMasterIdLst>
   <p:notesMasterIdLst>
-    <p:notesMasterId r:id="rId20"/>
+    <p:notesMasterId r:id="rId19"/>
   </p:notesMasterIdLst>
   <p:sldIdLst>
     <p:sldId id="393" r:id="rId2"/>
@@ -25,7 +25,6 @@
     <p:sldId id="615" r:id="rId16"/>
     <p:sldId id="595" r:id="rId17"/>
     <p:sldId id="598" r:id="rId18"/>
-    <p:sldId id="626" r:id="rId19"/>
   </p:sldIdLst>
   <p:sldSz cx="9144000" cy="6858000" type="screen4x3"/>
   <p:notesSz cx="7099300" cy="10234613"/>
@@ -154,6 +153,36 @@
       </a:defRPr>
     </a:lvl9pPr>
   </p:defaultTextStyle>
+  <p:extLst>
+    <p:ext uri="{EFAFB233-063F-42B5-8137-9DF3F51BA10A}">
+      <p15:sldGuideLst xmlns:p15="http://schemas.microsoft.com/office/powerpoint/2012/main">
+        <p15:guide id="1" orient="horz" pos="2160">
+          <p15:clr>
+            <a:srgbClr val="A4A3A4"/>
+          </p15:clr>
+        </p15:guide>
+        <p15:guide id="2" pos="2880">
+          <p15:clr>
+            <a:srgbClr val="A4A3A4"/>
+          </p15:clr>
+        </p15:guide>
+      </p15:sldGuideLst>
+    </p:ext>
+    <p:ext uri="{2D200454-40CA-4A62-9FC3-DE9A4176ACB9}">
+      <p15:notesGuideLst xmlns:p15="http://schemas.microsoft.com/office/powerpoint/2012/main">
+        <p15:guide id="1" orient="horz" pos="3224">
+          <p15:clr>
+            <a:srgbClr val="A4A3A4"/>
+          </p15:clr>
+        </p15:guide>
+        <p15:guide id="2" pos="2236">
+          <p15:clr>
+            <a:srgbClr val="A4A3A4"/>
+          </p15:clr>
+        </p15:guide>
+      </p15:notesGuideLst>
+    </p:ext>
+  </p:extLst>
 </p:presentation>
 </file>
 
@@ -206,14 +235,14 @@
           </a:ln>
           <a:extLst>
             <a:ext uri="{909E8E84-426E-40dd-AFC4-6F175D3DCCD1}">
-              <a14:hiddenFill xmlns:a14="http://schemas.microsoft.com/office/drawing/2010/main">
+              <a14:hiddenFill xmlns:a14="http://schemas.microsoft.com/office/drawing/2010/main" xmlns="">
                 <a:solidFill>
                   <a:srgbClr val="FFFFFF"/>
                 </a:solidFill>
               </a14:hiddenFill>
             </a:ext>
             <a:ext uri="{91240B29-F687-4f45-9708-019B960494DF}">
-              <a14:hiddenLine xmlns:a14="http://schemas.microsoft.com/office/drawing/2010/main" w="9525">
+              <a14:hiddenLine xmlns:a14="http://schemas.microsoft.com/office/drawing/2010/main" xmlns="" w="9525">
                 <a:solidFill>
                   <a:srgbClr val="000000"/>
                 </a:solidFill>
@@ -266,14 +295,14 @@
           </a:ln>
           <a:extLst>
             <a:ext uri="{909E8E84-426E-40dd-AFC4-6F175D3DCCD1}">
-              <a14:hiddenFill xmlns:a14="http://schemas.microsoft.com/office/drawing/2010/main">
+              <a14:hiddenFill xmlns:a14="http://schemas.microsoft.com/office/drawing/2010/main" xmlns="">
                 <a:solidFill>
                   <a:srgbClr val="FFFFFF"/>
                 </a:solidFill>
               </a14:hiddenFill>
             </a:ext>
             <a:ext uri="{91240B29-F687-4f45-9708-019B960494DF}">
-              <a14:hiddenLine xmlns:a14="http://schemas.microsoft.com/office/drawing/2010/main" w="9525">
+              <a14:hiddenLine xmlns:a14="http://schemas.microsoft.com/office/drawing/2010/main" xmlns="" w="9525">
                 <a:solidFill>
                   <a:srgbClr val="000000"/>
                 </a:solidFill>
@@ -301,7 +330,7 @@
             <a:fld id="{6BAA58E9-9897-4BCB-8E80-D7B66F95742D}" type="datetimeFigureOut">
               <a:rPr lang="en-GB" altLang="en-US"/>
               <a:pPr/>
-              <a:t>12/30/20</a:t>
+              <a:t>08/01/2021</a:t>
             </a:fld>
             <a:endParaRPr lang="en-GB" altLang="en-US"/>
           </a:p>
@@ -365,14 +394,14 @@
           </a:ln>
           <a:extLst>
             <a:ext uri="{909E8E84-426E-40dd-AFC4-6F175D3DCCD1}">
-              <a14:hiddenFill xmlns:a14="http://schemas.microsoft.com/office/drawing/2010/main">
+              <a14:hiddenFill xmlns:a14="http://schemas.microsoft.com/office/drawing/2010/main" xmlns="">
                 <a:solidFill>
                   <a:srgbClr val="FFFFFF"/>
                 </a:solidFill>
               </a14:hiddenFill>
             </a:ext>
             <a:ext uri="{91240B29-F687-4f45-9708-019B960494DF}">
-              <a14:hiddenLine xmlns:a14="http://schemas.microsoft.com/office/drawing/2010/main" w="9525">
+              <a14:hiddenLine xmlns:a14="http://schemas.microsoft.com/office/drawing/2010/main" xmlns="" w="9525">
                 <a:solidFill>
                   <a:srgbClr val="000000"/>
                 </a:solidFill>
@@ -393,35 +422,35 @@
           <a:p>
             <a:pPr lvl="0"/>
             <a:r>
-              <a:rPr lang="en-US" noProof="0" smtClean="0"/>
+              <a:rPr lang="en-US" noProof="0"/>
               <a:t>Click to edit Master text styles</a:t>
             </a:r>
           </a:p>
           <a:p>
             <a:pPr lvl="1"/>
             <a:r>
-              <a:rPr lang="en-US" noProof="0" smtClean="0"/>
+              <a:rPr lang="en-US" noProof="0"/>
               <a:t>Second level</a:t>
             </a:r>
           </a:p>
           <a:p>
             <a:pPr lvl="2"/>
             <a:r>
-              <a:rPr lang="en-US" noProof="0" smtClean="0"/>
+              <a:rPr lang="en-US" noProof="0"/>
               <a:t>Third level</a:t>
             </a:r>
           </a:p>
           <a:p>
             <a:pPr lvl="3"/>
             <a:r>
-              <a:rPr lang="en-US" noProof="0" smtClean="0"/>
+              <a:rPr lang="en-US" noProof="0"/>
               <a:t>Fourth level</a:t>
             </a:r>
           </a:p>
           <a:p>
             <a:pPr lvl="4"/>
             <a:r>
-              <a:rPr lang="en-US" noProof="0" smtClean="0"/>
+              <a:rPr lang="en-US" noProof="0"/>
               <a:t>Fifth level</a:t>
             </a:r>
             <a:endParaRPr lang="en-GB" noProof="0"/>
@@ -452,14 +481,14 @@
           </a:ln>
           <a:extLst>
             <a:ext uri="{909E8E84-426E-40dd-AFC4-6F175D3DCCD1}">
-              <a14:hiddenFill xmlns:a14="http://schemas.microsoft.com/office/drawing/2010/main">
+              <a14:hiddenFill xmlns:a14="http://schemas.microsoft.com/office/drawing/2010/main" xmlns="">
                 <a:solidFill>
                   <a:srgbClr val="FFFFFF"/>
                 </a:solidFill>
               </a14:hiddenFill>
             </a:ext>
             <a:ext uri="{91240B29-F687-4f45-9708-019B960494DF}">
-              <a14:hiddenLine xmlns:a14="http://schemas.microsoft.com/office/drawing/2010/main" w="9525">
+              <a14:hiddenLine xmlns:a14="http://schemas.microsoft.com/office/drawing/2010/main" xmlns="" w="9525">
                 <a:solidFill>
                   <a:srgbClr val="000000"/>
                 </a:solidFill>
@@ -512,14 +541,14 @@
           </a:ln>
           <a:extLst>
             <a:ext uri="{909E8E84-426E-40dd-AFC4-6F175D3DCCD1}">
-              <a14:hiddenFill xmlns:a14="http://schemas.microsoft.com/office/drawing/2010/main">
+              <a14:hiddenFill xmlns:a14="http://schemas.microsoft.com/office/drawing/2010/main" xmlns="">
                 <a:solidFill>
                   <a:srgbClr val="FFFFFF"/>
                 </a:solidFill>
               </a14:hiddenFill>
             </a:ext>
             <a:ext uri="{91240B29-F687-4f45-9708-019B960494DF}">
-              <a14:hiddenLine xmlns:a14="http://schemas.microsoft.com/office/drawing/2010/main" w="9525">
+              <a14:hiddenLine xmlns:a14="http://schemas.microsoft.com/office/drawing/2010/main" xmlns="" w="9525">
                 <a:solidFill>
                   <a:srgbClr val="000000"/>
                 </a:solidFill>
@@ -729,7 +758,7 @@
           </a:ln>
           <a:extLst>
             <a:ext uri="{909E8E84-426E-40dd-AFC4-6F175D3DCCD1}">
-              <a14:hiddenFill xmlns:a14="http://schemas.microsoft.com/office/drawing/2010/main">
+              <a14:hiddenFill xmlns:a14="http://schemas.microsoft.com/office/drawing/2010/main" xmlns="">
                 <a:solidFill>
                   <a:srgbClr val="FFFFFF"/>
                 </a:solidFill>
@@ -759,7 +788,7 @@
               </a:spcBef>
             </a:pPr>
             <a:r>
-              <a:rPr lang="en-GB" altLang="en-US" smtClean="0"/>
+              <a:rPr lang="en-GB" altLang="en-US"/>
               <a:t>http://www.gutenberg.org/cache/epub/2600/pg2600.txt</a:t>
             </a:r>
           </a:p>
@@ -770,10 +799,10 @@
               </a:spcBef>
             </a:pPr>
             <a:r>
-              <a:rPr lang="de-DE" altLang="en-US" smtClean="0"/>
+              <a:rPr lang="de-DE" altLang="en-US"/>
               <a:t>„Russia“ appears 173 times</a:t>
             </a:r>
-            <a:endParaRPr lang="en-GB" altLang="en-US" smtClean="0"/>
+            <a:endParaRPr lang="en-GB" altLang="en-US"/>
           </a:p>
         </p:txBody>
       </p:sp>
@@ -964,7 +993,7 @@
           </a:ln>
           <a:extLst>
             <a:ext uri="{909E8E84-426E-40dd-AFC4-6F175D3DCCD1}">
-              <a14:hiddenFill xmlns:a14="http://schemas.microsoft.com/office/drawing/2010/main">
+              <a14:hiddenFill xmlns:a14="http://schemas.microsoft.com/office/drawing/2010/main" xmlns="">
                 <a:solidFill>
                   <a:srgbClr val="FFFFFF"/>
                 </a:solidFill>
@@ -994,10 +1023,10 @@
               </a:spcBef>
             </a:pPr>
             <a:r>
-              <a:rPr lang="de-DE" altLang="en-US" smtClean="0"/>
+              <a:rPr lang="de-DE" altLang="en-US"/>
               <a:t>Add </a:t>
             </a:r>
-            <a:endParaRPr lang="en-GB" altLang="en-US" smtClean="0"/>
+            <a:endParaRPr lang="en-GB" altLang="en-US"/>
           </a:p>
         </p:txBody>
       </p:sp>
@@ -1807,10 +1836,9 @@
           </a:lstStyle>
           <a:p>
             <a:r>
-              <a:rPr lang="en-US" smtClean="0"/>
+              <a:rPr lang="en-US"/>
               <a:t>Click to edit Master title style</a:t>
             </a:r>
-            <a:endParaRPr lang="en-US"/>
           </a:p>
         </p:txBody>
       </p:sp>
@@ -1868,10 +1896,9 @@
           </a:lstStyle>
           <a:p>
             <a:r>
-              <a:rPr lang="en-US" smtClean="0"/>
+              <a:rPr lang="en-US"/>
               <a:t>Click to edit Master subtitle style</a:t>
             </a:r>
-            <a:endParaRPr lang="en-US"/>
           </a:p>
         </p:txBody>
       </p:sp>
@@ -1907,7 +1934,7 @@
               <a:pPr>
                 <a:defRPr/>
               </a:pPr>
-              <a:t>12/30/20</a:t>
+              <a:t>1/8/21</a:t>
             </a:fld>
             <a:endParaRPr lang="en-US"/>
           </a:p>
@@ -2203,10 +2230,9 @@
           </a:lstStyle>
           <a:p>
             <a:r>
-              <a:rPr lang="en-US" dirty="0" smtClean="0"/>
+              <a:rPr lang="en-US" dirty="0"/>
               <a:t>Click to edit Master title style</a:t>
             </a:r>
-            <a:endParaRPr lang="en-US" dirty="0"/>
           </a:p>
         </p:txBody>
       </p:sp>
@@ -2258,38 +2284,37 @@
           <a:p>
             <a:pPr lvl="0"/>
             <a:r>
-              <a:rPr lang="en-US" dirty="0" smtClean="0"/>
+              <a:rPr lang="en-US" dirty="0"/>
               <a:t>Click to edit Master text styles</a:t>
             </a:r>
           </a:p>
           <a:p>
             <a:pPr lvl="1"/>
             <a:r>
-              <a:rPr lang="en-US" dirty="0" smtClean="0"/>
+              <a:rPr lang="en-US" dirty="0"/>
               <a:t>Second level</a:t>
             </a:r>
           </a:p>
           <a:p>
             <a:pPr lvl="2"/>
             <a:r>
-              <a:rPr lang="en-US" dirty="0" smtClean="0"/>
+              <a:rPr lang="en-US" dirty="0"/>
               <a:t>Third level</a:t>
             </a:r>
           </a:p>
           <a:p>
             <a:pPr lvl="3"/>
             <a:r>
-              <a:rPr lang="en-US" dirty="0" smtClean="0"/>
+              <a:rPr lang="en-US" dirty="0"/>
               <a:t>Fourth level</a:t>
             </a:r>
           </a:p>
           <a:p>
             <a:pPr lvl="4"/>
             <a:r>
-              <a:rPr lang="en-US" dirty="0" smtClean="0"/>
+              <a:rPr lang="en-US" dirty="0"/>
               <a:t>Fifth level</a:t>
             </a:r>
-            <a:endParaRPr lang="en-US" dirty="0"/>
           </a:p>
         </p:txBody>
       </p:sp>
@@ -2325,7 +2350,7 @@
               <a:pPr>
                 <a:defRPr/>
               </a:pPr>
-              <a:t>12/30/20</a:t>
+              <a:t>1/8/21</a:t>
             </a:fld>
             <a:endParaRPr lang="en-US" dirty="0"/>
           </a:p>
@@ -2457,10 +2482,9 @@
           </a:lstStyle>
           <a:p>
             <a:r>
-              <a:rPr lang="en-US" smtClean="0"/>
+              <a:rPr lang="en-US"/>
               <a:t>Click to edit Master title style</a:t>
             </a:r>
-            <a:endParaRPr lang="en-US"/>
           </a:p>
         </p:txBody>
       </p:sp>
@@ -2526,7 +2550,7 @@
           <a:p>
             <a:pPr lvl="0"/>
             <a:r>
-              <a:rPr lang="en-US" smtClean="0"/>
+              <a:rPr lang="en-US"/>
               <a:t>Click to edit Master text styles</a:t>
             </a:r>
           </a:p>
@@ -2594,7 +2618,7 @@
           <a:p>
             <a:pPr lvl="0"/>
             <a:r>
-              <a:rPr lang="en-US" smtClean="0"/>
+              <a:rPr lang="en-US"/>
               <a:t>Click to edit Master text styles</a:t>
             </a:r>
           </a:p>
@@ -2638,38 +2662,37 @@
           <a:p>
             <a:pPr lvl="0"/>
             <a:r>
-              <a:rPr lang="en-US" smtClean="0"/>
+              <a:rPr lang="en-US"/>
               <a:t>Click to edit Master text styles</a:t>
             </a:r>
           </a:p>
           <a:p>
             <a:pPr lvl="1"/>
             <a:r>
-              <a:rPr lang="en-US" smtClean="0"/>
+              <a:rPr lang="en-US"/>
               <a:t>Second level</a:t>
             </a:r>
           </a:p>
           <a:p>
             <a:pPr lvl="2"/>
             <a:r>
-              <a:rPr lang="en-US" smtClean="0"/>
+              <a:rPr lang="en-US"/>
               <a:t>Third level</a:t>
             </a:r>
           </a:p>
           <a:p>
             <a:pPr lvl="3"/>
             <a:r>
-              <a:rPr lang="en-US" smtClean="0"/>
+              <a:rPr lang="en-US"/>
               <a:t>Fourth level</a:t>
             </a:r>
           </a:p>
           <a:p>
             <a:pPr lvl="4"/>
             <a:r>
-              <a:rPr lang="en-US" smtClean="0"/>
+              <a:rPr lang="en-US"/>
               <a:t>Fifth level</a:t>
             </a:r>
-            <a:endParaRPr lang="en-US"/>
           </a:p>
         </p:txBody>
       </p:sp>
@@ -2711,38 +2734,37 @@
           <a:p>
             <a:pPr lvl="0"/>
             <a:r>
-              <a:rPr lang="en-US" smtClean="0"/>
+              <a:rPr lang="en-US"/>
               <a:t>Click to edit Master text styles</a:t>
             </a:r>
           </a:p>
           <a:p>
             <a:pPr lvl="1"/>
             <a:r>
-              <a:rPr lang="en-US" smtClean="0"/>
+              <a:rPr lang="en-US"/>
               <a:t>Second level</a:t>
             </a:r>
           </a:p>
           <a:p>
             <a:pPr lvl="2"/>
             <a:r>
-              <a:rPr lang="en-US" smtClean="0"/>
+              <a:rPr lang="en-US"/>
               <a:t>Third level</a:t>
             </a:r>
           </a:p>
           <a:p>
             <a:pPr lvl="3"/>
             <a:r>
-              <a:rPr lang="en-US" smtClean="0"/>
+              <a:rPr lang="en-US"/>
               <a:t>Fourth level</a:t>
             </a:r>
           </a:p>
           <a:p>
             <a:pPr lvl="4"/>
             <a:r>
-              <a:rPr lang="en-US" smtClean="0"/>
+              <a:rPr lang="en-US"/>
               <a:t>Fifth level</a:t>
             </a:r>
-            <a:endParaRPr lang="en-US"/>
           </a:p>
         </p:txBody>
       </p:sp>
@@ -2773,7 +2795,7 @@
               <a:pPr>
                 <a:defRPr/>
               </a:pPr>
-              <a:t>12/30/20</a:t>
+              <a:t>1/8/21</a:t>
             </a:fld>
             <a:endParaRPr lang="en-US"/>
           </a:p>
@@ -2900,10 +2922,9 @@
           </a:lstStyle>
           <a:p>
             <a:r>
-              <a:rPr lang="en-US" smtClean="0"/>
+              <a:rPr lang="en-US"/>
               <a:t>Click to edit Master title style</a:t>
             </a:r>
-            <a:endParaRPr lang="en-US"/>
           </a:p>
         </p:txBody>
       </p:sp>
@@ -2939,7 +2960,7 @@
               <a:pPr>
                 <a:defRPr/>
               </a:pPr>
-              <a:t>12/30/20</a:t>
+              <a:t>1/8/21</a:t>
             </a:fld>
             <a:endParaRPr lang="en-US"/>
           </a:p>
@@ -3065,7 +3086,7 @@
               <a:pPr>
                 <a:defRPr/>
               </a:pPr>
-              <a:t>12/30/20</a:t>
+              <a:t>1/8/21</a:t>
             </a:fld>
             <a:endParaRPr lang="en-US"/>
           </a:p>
@@ -3189,10 +3210,9 @@
           </a:lstStyle>
           <a:p>
             <a:r>
-              <a:rPr lang="en-US" smtClean="0"/>
+              <a:rPr lang="en-US"/>
               <a:t>Click to edit Master title style</a:t>
             </a:r>
-            <a:endParaRPr lang="en-US"/>
           </a:p>
         </p:txBody>
       </p:sp>
@@ -3239,7 +3259,7 @@
           <a:p>
             <a:pPr lvl="0"/>
             <a:r>
-              <a:rPr lang="en-US" smtClean="0"/>
+              <a:rPr lang="en-US"/>
               <a:t>Click to edit Master text styles</a:t>
             </a:r>
           </a:p>
@@ -3283,38 +3303,37 @@
           <a:p>
             <a:pPr lvl="0"/>
             <a:r>
-              <a:rPr lang="en-US" smtClean="0"/>
+              <a:rPr lang="en-US"/>
               <a:t>Click to edit Master text styles</a:t>
             </a:r>
           </a:p>
           <a:p>
             <a:pPr lvl="1"/>
             <a:r>
-              <a:rPr lang="en-US" smtClean="0"/>
+              <a:rPr lang="en-US"/>
               <a:t>Second level</a:t>
             </a:r>
           </a:p>
           <a:p>
             <a:pPr lvl="2"/>
             <a:r>
-              <a:rPr lang="en-US" smtClean="0"/>
+              <a:rPr lang="en-US"/>
               <a:t>Third level</a:t>
             </a:r>
           </a:p>
           <a:p>
             <a:pPr lvl="3"/>
             <a:r>
-              <a:rPr lang="en-US" smtClean="0"/>
+              <a:rPr lang="en-US"/>
               <a:t>Fourth level</a:t>
             </a:r>
           </a:p>
           <a:p>
             <a:pPr lvl="4"/>
             <a:r>
-              <a:rPr lang="en-US" smtClean="0"/>
+              <a:rPr lang="en-US"/>
               <a:t>Fifth level</a:t>
             </a:r>
-            <a:endParaRPr lang="en-US"/>
           </a:p>
         </p:txBody>
       </p:sp>
@@ -3345,7 +3364,7 @@
               <a:pPr>
                 <a:defRPr/>
               </a:pPr>
-              <a:t>12/30/20</a:t>
+              <a:t>1/8/21</a:t>
             </a:fld>
             <a:endParaRPr lang="en-US"/>
           </a:p>
@@ -3469,10 +3488,9 @@
           </a:lstStyle>
           <a:p>
             <a:r>
-              <a:rPr lang="en-US" smtClean="0"/>
+              <a:rPr lang="en-US"/>
               <a:t>Click to edit Master title style</a:t>
             </a:r>
-            <a:endParaRPr lang="en-US"/>
           </a:p>
         </p:txBody>
       </p:sp>
@@ -3533,7 +3551,7 @@
           <a:p>
             <a:pPr lvl="0"/>
             <a:r>
-              <a:rPr lang="en-US" noProof="0" smtClean="0"/>
+              <a:rPr lang="en-US" noProof="0"/>
               <a:t>Click icon to add picture</a:t>
             </a:r>
             <a:endParaRPr lang="en-US" noProof="0" dirty="0"/>
@@ -3594,7 +3612,7 @@
           <a:p>
             <a:pPr lvl="0"/>
             <a:r>
-              <a:rPr lang="en-US" smtClean="0"/>
+              <a:rPr lang="en-US"/>
               <a:t>Click to edit Master text styles</a:t>
             </a:r>
           </a:p>
@@ -3627,7 +3645,7 @@
               <a:pPr>
                 <a:defRPr/>
               </a:pPr>
-              <a:t>12/30/20</a:t>
+              <a:t>1/8/21</a:t>
             </a:fld>
             <a:endParaRPr lang="en-US"/>
           </a:p>
@@ -3741,10 +3759,9 @@
           <a:lstStyle/>
           <a:p>
             <a:r>
-              <a:rPr lang="en-US" smtClean="0"/>
+              <a:rPr lang="en-US"/>
               <a:t>Click to edit Master title style</a:t>
             </a:r>
-            <a:endParaRPr lang="en-US"/>
           </a:p>
         </p:txBody>
       </p:sp>
@@ -3765,38 +3782,37 @@
           <a:p>
             <a:pPr lvl="0"/>
             <a:r>
-              <a:rPr lang="en-US" smtClean="0"/>
+              <a:rPr lang="en-US"/>
               <a:t>Click to edit Master text styles</a:t>
             </a:r>
           </a:p>
           <a:p>
             <a:pPr lvl="1"/>
             <a:r>
-              <a:rPr lang="en-US" smtClean="0"/>
+              <a:rPr lang="en-US"/>
               <a:t>Second level</a:t>
             </a:r>
           </a:p>
           <a:p>
             <a:pPr lvl="2"/>
             <a:r>
-              <a:rPr lang="en-US" smtClean="0"/>
+              <a:rPr lang="en-US"/>
               <a:t>Third level</a:t>
             </a:r>
           </a:p>
           <a:p>
             <a:pPr lvl="3"/>
             <a:r>
-              <a:rPr lang="en-US" smtClean="0"/>
+              <a:rPr lang="en-US"/>
               <a:t>Fourth level</a:t>
             </a:r>
           </a:p>
           <a:p>
             <a:pPr lvl="4"/>
             <a:r>
-              <a:rPr lang="en-US" smtClean="0"/>
+              <a:rPr lang="en-US"/>
               <a:t>Fifth level</a:t>
             </a:r>
-            <a:endParaRPr lang="en-US"/>
           </a:p>
         </p:txBody>
       </p:sp>
@@ -3827,7 +3843,7 @@
               <a:pPr>
                 <a:defRPr/>
               </a:pPr>
-              <a:t>12/30/20</a:t>
+              <a:t>1/8/21</a:t>
             </a:fld>
             <a:endParaRPr lang="en-US"/>
           </a:p>
@@ -3946,10 +3962,9 @@
           <a:lstStyle/>
           <a:p>
             <a:r>
-              <a:rPr lang="en-US" smtClean="0"/>
+              <a:rPr lang="en-US"/>
               <a:t>Click to edit Master title style</a:t>
             </a:r>
-            <a:endParaRPr lang="en-US"/>
           </a:p>
         </p:txBody>
       </p:sp>
@@ -3975,38 +3990,37 @@
           <a:p>
             <a:pPr lvl="0"/>
             <a:r>
-              <a:rPr lang="en-US" smtClean="0"/>
+              <a:rPr lang="en-US"/>
               <a:t>Click to edit Master text styles</a:t>
             </a:r>
           </a:p>
           <a:p>
             <a:pPr lvl="1"/>
             <a:r>
-              <a:rPr lang="en-US" smtClean="0"/>
+              <a:rPr lang="en-US"/>
               <a:t>Second level</a:t>
             </a:r>
           </a:p>
           <a:p>
             <a:pPr lvl="2"/>
             <a:r>
-              <a:rPr lang="en-US" smtClean="0"/>
+              <a:rPr lang="en-US"/>
               <a:t>Third level</a:t>
             </a:r>
           </a:p>
           <a:p>
             <a:pPr lvl="3"/>
             <a:r>
-              <a:rPr lang="en-US" smtClean="0"/>
+              <a:rPr lang="en-US"/>
               <a:t>Fourth level</a:t>
             </a:r>
           </a:p>
           <a:p>
             <a:pPr lvl="4"/>
             <a:r>
-              <a:rPr lang="en-US" smtClean="0"/>
+              <a:rPr lang="en-US"/>
               <a:t>Fifth level</a:t>
             </a:r>
-            <a:endParaRPr lang="en-US"/>
           </a:p>
         </p:txBody>
       </p:sp>
@@ -4037,7 +4051,7 @@
               <a:pPr>
                 <a:defRPr/>
               </a:pPr>
-              <a:t>12/30/20</a:t>
+              <a:t>1/8/21</a:t>
             </a:fld>
             <a:endParaRPr lang="en-US"/>
           </a:p>
@@ -4889,14 +4903,14 @@
           </a:ln>
           <a:extLst>
             <a:ext uri="{909E8E84-426E-40dd-AFC4-6F175D3DCCD1}">
-              <a14:hiddenFill xmlns:a14="http://schemas.microsoft.com/office/drawing/2010/main">
+              <a14:hiddenFill xmlns:a14="http://schemas.microsoft.com/office/drawing/2010/main" xmlns="">
                 <a:solidFill>
                   <a:srgbClr val="FFFFFF"/>
                 </a:solidFill>
               </a14:hiddenFill>
             </a:ext>
             <a:ext uri="{91240B29-F687-4f45-9708-019B960494DF}">
-              <a14:hiddenLine xmlns:a14="http://schemas.microsoft.com/office/drawing/2010/main" w="9525">
+              <a14:hiddenLine xmlns:a14="http://schemas.microsoft.com/office/drawing/2010/main" xmlns="" w="9525">
                 <a:solidFill>
                   <a:srgbClr val="000000"/>
                 </a:solidFill>
@@ -4917,7 +4931,7 @@
           <a:p>
             <a:pPr lvl="0"/>
             <a:r>
-              <a:rPr lang="en-US" altLang="en-US" smtClean="0"/>
+              <a:rPr lang="en-US" altLang="en-US"/>
               <a:t>Click to edit Master title style</a:t>
             </a:r>
           </a:p>
@@ -4947,14 +4961,14 @@
           </a:ln>
           <a:extLst>
             <a:ext uri="{909E8E84-426E-40dd-AFC4-6F175D3DCCD1}">
-              <a14:hiddenFill xmlns:a14="http://schemas.microsoft.com/office/drawing/2010/main">
+              <a14:hiddenFill xmlns:a14="http://schemas.microsoft.com/office/drawing/2010/main" xmlns="">
                 <a:solidFill>
                   <a:srgbClr val="FFFFFF"/>
                 </a:solidFill>
               </a14:hiddenFill>
             </a:ext>
             <a:ext uri="{91240B29-F687-4f45-9708-019B960494DF}">
-              <a14:hiddenLine xmlns:a14="http://schemas.microsoft.com/office/drawing/2010/main" w="9525">
+              <a14:hiddenLine xmlns:a14="http://schemas.microsoft.com/office/drawing/2010/main" xmlns="" w="9525">
                 <a:solidFill>
                   <a:srgbClr val="000000"/>
                 </a:solidFill>
@@ -4975,35 +4989,35 @@
           <a:p>
             <a:pPr lvl="0"/>
             <a:r>
-              <a:rPr lang="en-US" altLang="en-US" smtClean="0"/>
+              <a:rPr lang="en-US" altLang="en-US"/>
               <a:t>Click to edit Master text styles</a:t>
             </a:r>
           </a:p>
           <a:p>
             <a:pPr lvl="1"/>
             <a:r>
-              <a:rPr lang="en-US" altLang="en-US" smtClean="0"/>
+              <a:rPr lang="en-US" altLang="en-US"/>
               <a:t>Second level</a:t>
             </a:r>
           </a:p>
           <a:p>
             <a:pPr lvl="2"/>
             <a:r>
-              <a:rPr lang="en-US" altLang="en-US" smtClean="0"/>
+              <a:rPr lang="en-US" altLang="en-US"/>
               <a:t>Third level</a:t>
             </a:r>
           </a:p>
           <a:p>
             <a:pPr lvl="3"/>
             <a:r>
-              <a:rPr lang="en-US" altLang="en-US" smtClean="0"/>
+              <a:rPr lang="en-US" altLang="en-US"/>
               <a:t>Fourth level</a:t>
             </a:r>
           </a:p>
           <a:p>
             <a:pPr lvl="4"/>
             <a:r>
-              <a:rPr lang="en-US" altLang="en-US" smtClean="0"/>
+              <a:rPr lang="en-US" altLang="en-US"/>
               <a:t>Fifth level</a:t>
             </a:r>
           </a:p>
@@ -5056,7 +5070,7 @@
               <a:pPr>
                 <a:defRPr/>
               </a:pPr>
-              <a:t>12/30/20</a:t>
+              <a:t>1/8/21</a:t>
             </a:fld>
             <a:endParaRPr lang="en-US" dirty="0"/>
           </a:p>
@@ -5628,10 +5642,10 @@
           <a:lstStyle/>
           <a:p>
             <a:r>
-              <a:rPr lang="de-DE" altLang="en-US" sz="4000" dirty="0" smtClean="0"/>
+              <a:rPr lang="de-DE" altLang="en-US" sz="4000" dirty="0"/>
               <a:t>Text Analysis</a:t>
             </a:r>
-            <a:endParaRPr lang="en-GB" altLang="en-US" sz="4000" dirty="0" smtClean="0"/>
+            <a:endParaRPr lang="en-GB" altLang="en-US" sz="4000" dirty="0"/>
           </a:p>
         </p:txBody>
       </p:sp>
@@ -5778,7 +5792,7 @@
               <a:buNone/>
             </a:pPr>
             <a:r>
-              <a:rPr lang="en-US" altLang="en-US" sz="2200" dirty="0" smtClean="0">
+              <a:rPr lang="en-US" altLang="en-US" sz="2200" dirty="0">
                 <a:solidFill>
                   <a:schemeClr val="tx2"/>
                 </a:solidFill>
@@ -5800,13 +5814,6 @@
   <p:clrMapOvr>
     <a:masterClrMapping/>
   </p:clrMapOvr>
-  <p:timing>
-    <p:tnLst>
-      <p:par>
-        <p:cTn xmlns:p14="http://schemas.microsoft.com/office/powerpoint/2010/main" id="1" dur="indefinite" restart="never" nodeType="tmRoot"/>
-      </p:par>
-    </p:tnLst>
-  </p:timing>
 </p:sld>
 </file>
 
@@ -5843,10 +5850,9 @@
           <a:lstStyle/>
           <a:p>
             <a:r>
-              <a:rPr lang="en-US" dirty="0" smtClean="0"/>
+              <a:rPr lang="en-US" dirty="0"/>
               <a:t>Text analysis v. extraction</a:t>
             </a:r>
-            <a:endParaRPr lang="en-US" dirty="0"/>
           </a:p>
         </p:txBody>
       </p:sp>
@@ -5869,35 +5875,17 @@
               <a:rPr lang="en-US" sz="2400" dirty="0"/>
               <a:t>One problem with these approaches is that it is difficult to recognize which of the many relations that are shown are truly interesting. </a:t>
             </a:r>
-            <a:endParaRPr lang="en-US" sz="2400" dirty="0" smtClean="0"/>
-          </a:p>
-          <a:p>
-            <a:r>
-              <a:rPr lang="en-US" sz="2400" dirty="0" smtClean="0"/>
-              <a:t>You'll </a:t>
-            </a:r>
+          </a:p>
+          <a:p>
             <a:r>
               <a:rPr lang="en-US" sz="2400" dirty="0"/>
-              <a:t>immediately see who the big players are, but anyone who knows the business will already be aware of this. </a:t>
-            </a:r>
-            <a:endParaRPr lang="en-US" sz="2400" dirty="0" smtClean="0"/>
-          </a:p>
-          <a:p>
-            <a:r>
-              <a:rPr lang="en-US" sz="2400" dirty="0" smtClean="0"/>
-              <a:t>You'll </a:t>
-            </a:r>
+              <a:t>You'll immediately see who the big players are, but anyone who knows the business will already be aware of this. </a:t>
+            </a:r>
+          </a:p>
+          <a:p>
             <a:r>
               <a:rPr lang="en-US" sz="2400" dirty="0"/>
-              <a:t>also see many, many weak links between various players, </a:t>
-            </a:r>
-            <a:r>
-              <a:rPr lang="en-US" sz="2400" dirty="0" smtClean="0"/>
-              <a:t>even hundreds </a:t>
-            </a:r>
-            <a:r>
-              <a:rPr lang="en-US" sz="2400" dirty="0"/>
-              <a:t>or thousands of such links, and you can't tell which are the really interesting ones that you should pay attention to.</a:t>
+              <a:t>You'll also see many, many weak links between various players, even hundreds or thousands of such links, and you can't tell which are the really interesting ones that you should pay attention to.</a:t>
             </a:r>
           </a:p>
         </p:txBody>
@@ -5948,10 +5936,9 @@
           <a:lstStyle/>
           <a:p>
             <a:r>
-              <a:rPr lang="en-US" dirty="0" smtClean="0"/>
+              <a:rPr lang="en-US" dirty="0"/>
               <a:t>Text analysis development</a:t>
             </a:r>
-            <a:endParaRPr lang="en-US" dirty="0"/>
           </a:p>
         </p:txBody>
       </p:sp>
@@ -5972,44 +5959,14 @@
           <a:p>
             <a:r>
               <a:rPr lang="en-US" dirty="0"/>
-              <a:t>To get farther though we need more sophisticated language analysis. </a:t>
-            </a:r>
-            <a:r>
-              <a:rPr lang="en-US" dirty="0" smtClean="0"/>
-              <a:t> A </a:t>
-            </a:r>
+              <a:t>To get farther though we need more sophisticated language analysis.  A number of researchers are working on statistical techniques that try to assign semantics, or meaning, to parts of the text. </a:t>
+            </a:r>
+          </a:p>
+          <a:p>
             <a:r>
               <a:rPr lang="en-US" dirty="0"/>
-              <a:t>number of </a:t>
-            </a:r>
-            <a:r>
-              <a:rPr lang="en-US" dirty="0" smtClean="0"/>
-              <a:t>researchers are </a:t>
-            </a:r>
-            <a:r>
-              <a:rPr lang="en-US" dirty="0"/>
-              <a:t>working on statistical techniques that try to assign semantics, or meaning, to parts of the text. </a:t>
-            </a:r>
-            <a:endParaRPr lang="en-US" dirty="0" smtClean="0"/>
-          </a:p>
-          <a:p>
-            <a:r>
-              <a:rPr lang="en-US" dirty="0" smtClean="0"/>
-              <a:t>They break </a:t>
-            </a:r>
-            <a:r>
-              <a:rPr lang="en-US" dirty="0"/>
-              <a:t>off pieces of the problem of analysis, </a:t>
-            </a:r>
-            <a:r>
-              <a:rPr lang="en-US" dirty="0" smtClean="0"/>
-              <a:t>targeted </a:t>
-            </a:r>
-            <a:r>
-              <a:rPr lang="en-US" dirty="0"/>
-              <a:t>towards particular applications, rather than trying to "read" the articles as a whole. </a:t>
-            </a:r>
-            <a:endParaRPr lang="en-US" dirty="0" smtClean="0"/>
+              <a:t>They break off pieces of the problem of analysis, targeted towards particular applications, rather than trying to "read" the articles as a whole. </a:t>
+            </a:r>
           </a:p>
         </p:txBody>
       </p:sp>
@@ -6059,10 +6016,9 @@
           <a:lstStyle/>
           <a:p>
             <a:r>
-              <a:rPr lang="en-US" dirty="0" smtClean="0"/>
+              <a:rPr lang="en-US" dirty="0"/>
               <a:t>Limitations of text analysis</a:t>
             </a:r>
-            <a:endParaRPr lang="en-US" dirty="0"/>
           </a:p>
         </p:txBody>
       </p:sp>
@@ -6083,67 +6039,20 @@
           <a:p>
             <a:r>
               <a:rPr lang="en-US" sz="2200" dirty="0"/>
-              <a:t>The fundamental limitations of text </a:t>
-            </a:r>
-            <a:r>
-              <a:rPr lang="en-US" sz="2200" dirty="0" smtClean="0"/>
-              <a:t>analysis are </a:t>
-            </a:r>
+              <a:t>The fundamental limitations of text analysis are first, that we will not be able to write programs that fully interpret text for a very long time, and second, that the information one needs is often not recorded in textual form. </a:t>
+            </a:r>
+          </a:p>
+          <a:p>
             <a:r>
               <a:rPr lang="en-US" sz="2200" dirty="0"/>
-              <a:t>first, that we will not be able to write programs that fully interpret text for a very long time, and second, that the information one needs is often not recorded in textual form. </a:t>
-            </a:r>
-            <a:endParaRPr lang="en-US" sz="2200" dirty="0" smtClean="0"/>
-          </a:p>
-          <a:p>
-            <a:r>
-              <a:rPr lang="en-US" sz="2200" dirty="0" smtClean="0"/>
-              <a:t>If </a:t>
-            </a:r>
+              <a:t>If I tried to write a program that detected when and where a new word came into existence, and how it spread by analyzing web pages, I would miss important clues relating to usage in spoken conversations, email, on the radio and TV, and so on. </a:t>
+            </a:r>
+          </a:p>
+          <a:p>
             <a:r>
               <a:rPr lang="en-US" sz="2200" dirty="0"/>
-              <a:t>I tried to write a program that detected when </a:t>
-            </a:r>
-            <a:r>
-              <a:rPr lang="en-US" sz="2200" dirty="0" smtClean="0"/>
-              <a:t>and </a:t>
-            </a:r>
-            <a:r>
-              <a:rPr lang="en-US" sz="2200" dirty="0"/>
-              <a:t>where a new word came into </a:t>
-            </a:r>
-            <a:r>
-              <a:rPr lang="en-US" sz="2200" dirty="0" smtClean="0"/>
-              <a:t>existence, </a:t>
-            </a:r>
-            <a:r>
-              <a:rPr lang="en-US" sz="2200" dirty="0"/>
-              <a:t>and how it spread by analyzing web pages, I would miss important clues relating to usage in spoken conversations, email, on the radio and TV, and so on. </a:t>
-            </a:r>
-            <a:endParaRPr lang="en-US" sz="2200" dirty="0" smtClean="0"/>
-          </a:p>
-          <a:p>
-            <a:r>
-              <a:rPr lang="en-US" sz="2200" dirty="0" smtClean="0"/>
-              <a:t>Similarly</a:t>
-            </a:r>
-            <a:r>
-              <a:rPr lang="en-US" sz="2200" dirty="0"/>
-              <a:t>, </a:t>
-            </a:r>
-            <a:r>
-              <a:rPr lang="en-US" sz="2200" dirty="0" smtClean="0"/>
-              <a:t>if </a:t>
-            </a:r>
-            <a:r>
-              <a:rPr lang="en-US" sz="2200" dirty="0"/>
-              <a:t>I tried to write a program that processes published documents in order to guess what will happen to a bill in Washington DC, I would fail because most of the action still happens in negotiations behind closed </a:t>
-            </a:r>
-            <a:r>
-              <a:rPr lang="en-US" sz="2200" dirty="0" smtClean="0"/>
-              <a:t>doors.</a:t>
-            </a:r>
-            <a:endParaRPr lang="en-US" sz="2200" dirty="0"/>
+              <a:t>Similarly, if I tried to write a program that processes published documents in order to guess what will happen to a bill in Washington DC, I would fail because most of the action still happens in negotiations behind closed doors.</a:t>
+            </a:r>
           </a:p>
         </p:txBody>
       </p:sp>
@@ -6206,7 +6115,7 @@
               <a:defRPr/>
             </a:pPr>
             <a:r>
-              <a:rPr lang="de-DE" dirty="0" smtClean="0"/>
+              <a:rPr lang="de-DE" dirty="0"/>
               <a:t>Voyant </a:t>
             </a:r>
             <a:endParaRPr lang="en-GB" sz="3100" i="1" dirty="0"/>
@@ -6248,13 +6157,6 @@
   <p:clrMapOvr>
     <a:masterClrMapping/>
   </p:clrMapOvr>
-  <p:timing>
-    <p:tnLst>
-      <p:par>
-        <p:cTn xmlns:p14="http://schemas.microsoft.com/office/powerpoint/2010/main" id="1" dur="indefinite" restart="never" nodeType="tmRoot"/>
-      </p:par>
-    </p:tnLst>
-  </p:timing>
 </p:sld>
 </file>
 
@@ -6299,7 +6201,7 @@
               <a:rPr lang="de-DE" sz="3200" dirty="0"/>
               <a:t>Examples of Voyant in Research</a:t>
             </a:r>
-            <a:endParaRPr lang="en-GB" altLang="en-US" sz="3200" dirty="0" smtClean="0"/>
+            <a:endParaRPr lang="en-GB" altLang="en-US" sz="3200" dirty="0"/>
           </a:p>
         </p:txBody>
       </p:sp>
@@ -6337,10 +6239,10 @@
               <a:defRPr/>
             </a:pPr>
             <a:r>
-              <a:rPr lang="de-DE" dirty="0" smtClean="0"/>
+              <a:rPr lang="de-DE" dirty="0"/>
               <a:t>Voyant Examples:</a:t>
             </a:r>
-            <a:endParaRPr lang="en-GB" dirty="0" smtClean="0"/>
+            <a:endParaRPr lang="en-GB" dirty="0"/>
           </a:p>
           <a:p>
             <a:pPr marL="109728" indent="0" fontAlgn="auto">
@@ -6355,28 +6257,15 @@
               <a:defRPr/>
             </a:pPr>
             <a:r>
-              <a:rPr lang="en-GB" sz="2400" dirty="0" smtClean="0">
-                <a:hlinkClick r:id="rId2"/>
-              </a:rPr>
-              <a:t>http</a:t>
-            </a:r>
-            <a:r>
               <a:rPr lang="en-GB" sz="2400" dirty="0">
                 <a:hlinkClick r:id="rId2"/>
               </a:rPr>
-              <a:t>://docs.voyant-tools.org/about/examples-gallery</a:t>
-            </a:r>
-            <a:r>
-              <a:rPr lang="en-GB" sz="2400" dirty="0" smtClean="0">
-                <a:hlinkClick r:id="rId2"/>
-              </a:rPr>
-              <a:t>/</a:t>
-            </a:r>
-            <a:r>
-              <a:rPr lang="en-GB" sz="2400" dirty="0" smtClean="0"/>
+              <a:t>http://docs.voyant-tools.org/about/examples-gallery/</a:t>
+            </a:r>
+            <a:r>
+              <a:rPr lang="en-GB" sz="2400" dirty="0"/>
               <a:t> </a:t>
             </a:r>
-            <a:endParaRPr lang="en-GB" sz="2400" dirty="0"/>
           </a:p>
         </p:txBody>
       </p:sp>
@@ -6385,13 +6274,6 @@
   <p:clrMapOvr>
     <a:masterClrMapping/>
   </p:clrMapOvr>
-  <p:timing>
-    <p:tnLst>
-      <p:par>
-        <p:cTn xmlns:p14="http://schemas.microsoft.com/office/powerpoint/2010/main" id="1" dur="indefinite" restart="never" nodeType="tmRoot"/>
-      </p:par>
-    </p:tnLst>
-  </p:timing>
 </p:sld>
 </file>
 
@@ -6436,7 +6318,7 @@
           <a:lstStyle/>
           <a:p>
             <a:r>
-              <a:rPr lang="en-GB" altLang="en-US" sz="3600" dirty="0" smtClean="0">
+              <a:rPr lang="en-GB" altLang="en-US" sz="3600" dirty="0">
                 <a:solidFill>
                   <a:schemeClr val="bg1"/>
                 </a:solidFill>
@@ -6444,14 +6326,14 @@
               <a:t>Using </a:t>
             </a:r>
             <a:r>
-              <a:rPr lang="en-GB" altLang="en-US" sz="3600" dirty="0" err="1" smtClean="0">
+              <a:rPr lang="en-GB" altLang="en-US" sz="3600" dirty="0" err="1">
                 <a:solidFill>
                   <a:schemeClr val="bg1"/>
                 </a:solidFill>
               </a:rPr>
               <a:t>Voyant</a:t>
             </a:r>
-            <a:endParaRPr lang="en-GB" altLang="en-US" sz="3600" dirty="0" smtClean="0">
+            <a:endParaRPr lang="en-GB" altLang="en-US" sz="3600" dirty="0">
               <a:solidFill>
                 <a:schemeClr val="bg1"/>
               </a:solidFill>
@@ -6485,11 +6367,11 @@
               <a:buNone/>
             </a:pPr>
             <a:r>
-              <a:rPr lang="en-GB" altLang="en-US" dirty="0" err="1" smtClean="0"/>
+              <a:rPr lang="en-GB" altLang="en-US" dirty="0" err="1"/>
               <a:t>Voyant</a:t>
             </a:r>
             <a:r>
-              <a:rPr lang="en-GB" altLang="en-US" dirty="0" smtClean="0"/>
+              <a:rPr lang="en-GB" altLang="en-US" dirty="0"/>
               <a:t> homepage:</a:t>
             </a:r>
           </a:p>
@@ -6498,12 +6380,12 @@
               <a:buNone/>
             </a:pPr>
             <a:r>
-              <a:rPr lang="en-GB" altLang="en-US" dirty="0" smtClean="0">
+              <a:rPr lang="en-GB" altLang="en-US" dirty="0">
                 <a:hlinkClick r:id="rId2"/>
               </a:rPr>
               <a:t>https://voyant-tools.org/</a:t>
             </a:r>
-            <a:endParaRPr lang="en-GB" altLang="en-US" dirty="0" smtClean="0"/>
+            <a:endParaRPr lang="en-GB" altLang="en-US" dirty="0"/>
           </a:p>
           <a:p>
             <a:pPr marL="109538" indent="0">
@@ -6516,11 +6398,11 @@
               <a:buNone/>
             </a:pPr>
             <a:r>
-              <a:rPr lang="en-GB" altLang="en-US" dirty="0" err="1" smtClean="0"/>
+              <a:rPr lang="en-GB" altLang="en-US" dirty="0" err="1"/>
               <a:t>Voyant</a:t>
             </a:r>
             <a:r>
-              <a:rPr lang="en-GB" altLang="en-US" dirty="0" smtClean="0"/>
+              <a:rPr lang="en-GB" altLang="en-US" dirty="0"/>
               <a:t> help page:</a:t>
             </a:r>
           </a:p>
@@ -6532,16 +6414,10 @@
               <a:rPr lang="en-US" u="sng" dirty="0">
                 <a:hlinkClick r:id="rId3"/>
               </a:rPr>
-              <a:t>http://docs.voyant-tools.org/start</a:t>
-            </a:r>
-            <a:r>
-              <a:rPr lang="en-US" u="sng" dirty="0" smtClean="0">
-                <a:hlinkClick r:id="rId3"/>
-              </a:rPr>
-              <a:t>/</a:t>
-            </a:r>
-            <a:r>
-              <a:rPr lang="en-GB" altLang="en-US" dirty="0" smtClean="0"/>
+              <a:t>http://docs.voyant-tools.org/start/</a:t>
+            </a:r>
+            <a:r>
+              <a:rPr lang="en-GB" altLang="en-US" dirty="0"/>
               <a:t> </a:t>
             </a:r>
           </a:p>
@@ -6552,13 +6428,6 @@
   <p:clrMapOvr>
     <a:masterClrMapping/>
   </p:clrMapOvr>
-  <p:timing>
-    <p:tnLst>
-      <p:par>
-        <p:cTn xmlns:p14="http://schemas.microsoft.com/office/powerpoint/2010/main" id="1" dur="indefinite" restart="never" nodeType="tmRoot"/>
-      </p:par>
-    </p:tnLst>
-  </p:timing>
 </p:sld>
 </file>
 
@@ -6600,10 +6469,10 @@
           <a:lstStyle/>
           <a:p>
             <a:r>
-              <a:rPr lang="de-DE" altLang="en-US" smtClean="0"/>
+              <a:rPr lang="de-DE" altLang="en-US"/>
               <a:t>More DH-specific tools</a:t>
             </a:r>
-            <a:endParaRPr lang="en-GB" altLang="en-US" smtClean="0"/>
+            <a:endParaRPr lang="en-GB" altLang="en-US"/>
           </a:p>
         </p:txBody>
       </p:sp>
@@ -6692,13 +6561,6 @@
   <p:clrMapOvr>
     <a:masterClrMapping/>
   </p:clrMapOvr>
-  <p:timing>
-    <p:tnLst>
-      <p:par>
-        <p:cTn xmlns:p14="http://schemas.microsoft.com/office/powerpoint/2010/main" id="1" dur="indefinite" restart="never" nodeType="tmRoot"/>
-      </p:par>
-    </p:tnLst>
-  </p:timing>
 </p:sld>
 </file>
 
@@ -6748,11 +6610,11 @@
               <a:defRPr/>
             </a:pPr>
             <a:r>
-              <a:rPr lang="de-DE" smtClean="0"/>
+              <a:rPr lang="de-DE"/>
               <a:t>Tools </a:t>
             </a:r>
             <a:r>
-              <a:rPr lang="de-DE" sz="3100" dirty="0" smtClean="0"/>
+              <a:rPr lang="de-DE" sz="3100" dirty="0"/>
               <a:t>(powerful, but require some computing experience)</a:t>
             </a:r>
             <a:endParaRPr lang="en-GB" sz="3100" dirty="0">
@@ -6797,7 +6659,7 @@
               <a:defRPr/>
             </a:pPr>
             <a:r>
-              <a:rPr lang="en-GB" dirty="0" smtClean="0"/>
+              <a:rPr lang="en-GB" dirty="0"/>
               <a:t>Ling Pipe</a:t>
             </a:r>
           </a:p>
@@ -6811,20 +6673,8 @@
               <a:defRPr/>
             </a:pPr>
             <a:r>
-              <a:rPr lang="en-GB" dirty="0" smtClean="0"/>
-              <a:t>linguistic </a:t>
-            </a:r>
-            <a:r>
               <a:rPr lang="en-GB" dirty="0"/>
-              <a:t>processing of </a:t>
-            </a:r>
-            <a:r>
-              <a:rPr lang="en-GB" dirty="0" smtClean="0"/>
-              <a:t>text including </a:t>
-            </a:r>
-            <a:r>
-              <a:rPr lang="en-GB" dirty="0"/>
-              <a:t>entity extraction, clustering and classification, etc.</a:t>
+              <a:t>linguistic processing of text including entity extraction, clustering and classification, etc.</a:t>
             </a:r>
           </a:p>
           <a:p>
@@ -6837,12 +6687,8 @@
               <a:defRPr/>
             </a:pPr>
             <a:r>
-              <a:rPr lang="en-GB" dirty="0" smtClean="0"/>
-              <a:t>http</a:t>
-            </a:r>
-            <a:r>
               <a:rPr lang="en-GB" dirty="0"/>
-              <a:t>://alias-i.com/lingpipe/</a:t>
+              <a:t>http://alias-i.com/lingpipe/</a:t>
             </a:r>
           </a:p>
           <a:p>
@@ -6858,7 +6704,7 @@
               <a:defRPr/>
             </a:pPr>
             <a:r>
-              <a:rPr lang="en-GB" dirty="0" err="1" smtClean="0"/>
+              <a:rPr lang="en-GB" dirty="0" err="1"/>
               <a:t>OpenNLP</a:t>
             </a:r>
             <a:endParaRPr lang="en-GB" dirty="0"/>
@@ -6873,34 +6719,17 @@
               <a:defRPr/>
             </a:pPr>
             <a:r>
-              <a:rPr lang="en-GB" dirty="0" smtClean="0"/>
-              <a:t>the </a:t>
-            </a:r>
-            <a:r>
               <a:rPr lang="en-GB" dirty="0"/>
-              <a:t>most common NLP tasks, </a:t>
-            </a:r>
-            <a:r>
-              <a:rPr lang="en-GB" dirty="0" smtClean="0"/>
-              <a:t>such as </a:t>
+              <a:t>the most common NLP tasks, such as POS tagging, named entity extraction, chunking and </a:t>
+            </a:r>
+            <a:r>
+              <a:rPr lang="en-GB" dirty="0" err="1"/>
+              <a:t>coreference</a:t>
             </a:r>
             <a:r>
               <a:rPr lang="en-GB" dirty="0"/>
-              <a:t>POS tagging, named entity extraction, chunking and </a:t>
-            </a:r>
-            <a:r>
-              <a:rPr lang="en-GB" dirty="0" err="1" smtClean="0"/>
-              <a:t>coreference</a:t>
-            </a:r>
-            <a:r>
-              <a:rPr lang="en-GB" dirty="0" smtClean="0"/>
-              <a:t> resolution</a:t>
-            </a:r>
-            <a:r>
-              <a:rPr lang="en-GB" dirty="0"/>
-              <a:t>. </a:t>
-            </a:r>
-            <a:endParaRPr lang="en-GB" dirty="0" smtClean="0"/>
+              <a:t> resolution. </a:t>
+            </a:r>
           </a:p>
           <a:p>
             <a:pPr marL="658368" lvl="1" indent="-246888" fontAlgn="auto">
@@ -6912,12 +6741,8 @@
               <a:defRPr/>
             </a:pPr>
             <a:r>
-              <a:rPr lang="en-GB" dirty="0" smtClean="0"/>
-              <a:t>http</a:t>
-            </a:r>
-            <a:r>
               <a:rPr lang="en-GB" dirty="0"/>
-              <a:t>://opennlp.apache.org/</a:t>
+              <a:t>http://opennlp.apache.org/</a:t>
             </a:r>
           </a:p>
           <a:p>
@@ -6933,14 +6758,9 @@
               <a:defRPr/>
             </a:pPr>
             <a:r>
-              <a:rPr lang="en-GB" dirty="0" smtClean="0"/>
-              <a:t>Stanford Parser </a:t>
-            </a:r>
-            <a:r>
               <a:rPr lang="en-GB" dirty="0"/>
-              <a:t>and Part-of-Speech (POS) Tagger </a:t>
-            </a:r>
-            <a:endParaRPr lang="en-GB" dirty="0" smtClean="0"/>
+              <a:t>Stanford Parser and Part-of-Speech (POS) Tagger </a:t>
+            </a:r>
           </a:p>
           <a:p>
             <a:pPr marL="658368" lvl="1" indent="-246888" fontAlgn="auto">
@@ -6952,12 +6772,8 @@
               <a:defRPr/>
             </a:pPr>
             <a:r>
-              <a:rPr lang="en-GB" dirty="0" smtClean="0"/>
-              <a:t>http</a:t>
-            </a:r>
-            <a:r>
               <a:rPr lang="en-GB" dirty="0"/>
-              <a:t>://nlp.stanford.edu/software/tagger.shtm/</a:t>
+              <a:t>http://nlp.stanford.edu/software/tagger.shtm/</a:t>
             </a:r>
           </a:p>
           <a:p>
@@ -6973,7 +6789,7 @@
               <a:defRPr/>
             </a:pPr>
             <a:r>
-              <a:rPr lang="en-GB" dirty="0" smtClean="0"/>
+              <a:rPr lang="en-GB" dirty="0"/>
               <a:t>NTLK</a:t>
             </a:r>
           </a:p>
@@ -6987,16 +6803,8 @@
               <a:defRPr/>
             </a:pPr>
             <a:r>
-              <a:rPr lang="en-GB" dirty="0" smtClean="0"/>
-              <a:t>Toolkit for teaching </a:t>
-            </a:r>
-            <a:r>
               <a:rPr lang="en-GB" dirty="0"/>
-              <a:t>and researching classification, clustering </a:t>
-            </a:r>
-            <a:r>
-              <a:rPr lang="en-GB" dirty="0" smtClean="0"/>
-              <a:t>and parsing</a:t>
+              <a:t>Toolkit for teaching and researching classification, clustering and parsing</a:t>
             </a:r>
           </a:p>
           <a:p>
@@ -7009,12 +6817,8 @@
               <a:defRPr/>
             </a:pPr>
             <a:r>
-              <a:rPr lang="en-GB" dirty="0" smtClean="0"/>
-              <a:t>http</a:t>
-            </a:r>
-            <a:r>
               <a:rPr lang="en-GB" dirty="0"/>
-              <a:t>://www.nltk.org/</a:t>
+              <a:t>http://www.nltk.org/</a:t>
             </a:r>
           </a:p>
           <a:p>
@@ -7030,7 +6834,7 @@
               <a:defRPr/>
             </a:pPr>
             <a:r>
-              <a:rPr lang="en-GB" dirty="0" err="1" smtClean="0"/>
+              <a:rPr lang="en-GB" dirty="0" err="1"/>
               <a:t>OpinionFinder</a:t>
             </a:r>
             <a:endParaRPr lang="en-GB" dirty="0"/>
@@ -7045,28 +6849,8 @@
               <a:defRPr/>
             </a:pPr>
             <a:r>
-              <a:rPr lang="en-GB" dirty="0" smtClean="0"/>
-              <a:t>subjective sentences, source </a:t>
-            </a:r>
-            <a:r>
               <a:rPr lang="en-GB" dirty="0"/>
-              <a:t>(holder</a:t>
-            </a:r>
-            <a:r>
-              <a:rPr lang="en-GB" dirty="0" smtClean="0"/>
-              <a:t>) of </a:t>
-            </a:r>
-            <a:r>
-              <a:rPr lang="en-GB" dirty="0"/>
-              <a:t>the subjectivity and words that are included in </a:t>
-            </a:r>
-            <a:r>
-              <a:rPr lang="en-GB" dirty="0" smtClean="0"/>
-              <a:t>phrases expressing </a:t>
-            </a:r>
-            <a:r>
-              <a:rPr lang="en-GB" dirty="0"/>
-              <a:t>positive or negative sentiments.</a:t>
+              <a:t>subjective sentences, source (holder) of the subjectivity and words that are included in phrases expressing positive or negative sentiments.</a:t>
             </a:r>
           </a:p>
           <a:p>
@@ -7079,24 +6863,12 @@
               <a:defRPr/>
             </a:pPr>
             <a:r>
-              <a:rPr lang="en-GB" dirty="0" smtClean="0">
-                <a:hlinkClick r:id="rId3"/>
-              </a:rPr>
-              <a:t>http</a:t>
-            </a:r>
-            <a:r>
               <a:rPr lang="en-GB" dirty="0">
                 <a:hlinkClick r:id="rId3"/>
               </a:rPr>
-              <a:t>://</a:t>
-            </a:r>
-            <a:r>
-              <a:rPr lang="en-GB" dirty="0" smtClean="0">
-                <a:hlinkClick r:id="rId3"/>
-              </a:rPr>
-              <a:t>code.google.com/p/opinionfinder/</a:t>
-            </a:r>
-            <a:endParaRPr lang="en-GB" dirty="0" smtClean="0"/>
+              <a:t>http://code.google.com/p/opinionfinder/</a:t>
+            </a:r>
+            <a:endParaRPr lang="en-GB" dirty="0"/>
           </a:p>
           <a:p>
             <a:pPr marL="365760" indent="-256032" fontAlgn="auto">
@@ -7111,7 +6883,7 @@
               <a:defRPr/>
             </a:pPr>
             <a:r>
-              <a:rPr lang="de-DE" dirty="0" smtClean="0"/>
+              <a:rPr lang="de-DE" dirty="0"/>
               <a:t>Basic sentiment tokenizer plus some tools, by Christopher Potts</a:t>
             </a:r>
           </a:p>
@@ -7125,12 +6897,12 @@
               <a:defRPr/>
             </a:pPr>
             <a:r>
-              <a:rPr lang="de-DE" dirty="0" smtClean="0">
+              <a:rPr lang="de-DE" dirty="0">
                 <a:hlinkClick r:id="rId4"/>
               </a:rPr>
               <a:t>http://sentiment.christopherpotts.net</a:t>
             </a:r>
-            <a:endParaRPr lang="de-DE" dirty="0" smtClean="0"/>
+            <a:endParaRPr lang="de-DE" dirty="0"/>
           </a:p>
           <a:p>
             <a:pPr marL="365760" indent="-256032" fontAlgn="auto">
@@ -7145,7 +6917,7 @@
               <a:defRPr/>
             </a:pPr>
             <a:r>
-              <a:rPr lang="de-DE" dirty="0" smtClean="0"/>
+              <a:rPr lang="de-DE" dirty="0"/>
               <a:t>Twitter NLP and Part-of-speech tagging</a:t>
             </a:r>
           </a:p>
@@ -7159,134 +6931,19 @@
               <a:defRPr/>
             </a:pPr>
             <a:r>
-              <a:rPr lang="de-DE" dirty="0" smtClean="0">
+              <a:rPr lang="de-DE" dirty="0">
                 <a:hlinkClick r:id="rId5"/>
               </a:rPr>
               <a:t>http://www.ark.cs.cmu.edu/TweetNLP/</a:t>
             </a:r>
             <a:r>
-              <a:rPr lang="de-DE" dirty="0" smtClean="0"/>
+              <a:rPr lang="de-DE" dirty="0"/>
               <a:t> </a:t>
             </a:r>
           </a:p>
         </p:txBody>
       </p:sp>
     </p:spTree>
-  </p:cSld>
-  <p:clrMapOvr>
-    <a:masterClrMapping/>
-  </p:clrMapOvr>
-  <p:timing>
-    <p:tnLst>
-      <p:par>
-        <p:cTn xmlns:p14="http://schemas.microsoft.com/office/powerpoint/2010/main" id="1" dur="indefinite" restart="never" nodeType="tmRoot"/>
-      </p:par>
-    </p:tnLst>
-  </p:timing>
-</p:sld>
-</file>
-
-<file path=ppt/slides/slide18.xml><?xml version="1.0" encoding="utf-8"?>
-<p:sld xmlns:a="http://schemas.openxmlformats.org/drawingml/2006/main" xmlns:r="http://schemas.openxmlformats.org/officeDocument/2006/relationships" xmlns:p="http://schemas.openxmlformats.org/presentationml/2006/main">
-  <p:cSld>
-    <p:spTree>
-      <p:nvGrpSpPr>
-        <p:cNvPr id="1" name=""/>
-        <p:cNvGrpSpPr/>
-        <p:nvPr/>
-      </p:nvGrpSpPr>
-      <p:grpSpPr>
-        <a:xfrm>
-          <a:off x="0" y="0"/>
-          <a:ext cx="0" cy="0"/>
-          <a:chOff x="0" y="0"/>
-          <a:chExt cx="0" cy="0"/>
-        </a:xfrm>
-      </p:grpSpPr>
-      <p:sp>
-        <p:nvSpPr>
-          <p:cNvPr id="2" name="Title 1"/>
-          <p:cNvSpPr>
-            <a:spLocks noGrp="1"/>
-          </p:cNvSpPr>
-          <p:nvPr>
-            <p:ph type="title"/>
-          </p:nvPr>
-        </p:nvSpPr>
-        <p:spPr/>
-        <p:txBody>
-          <a:bodyPr/>
-          <a:lstStyle/>
-          <a:p>
-            <a:r>
-              <a:rPr lang="en-US" dirty="0" smtClean="0"/>
-              <a:t>Next class…</a:t>
-            </a:r>
-            <a:endParaRPr lang="en-US" dirty="0"/>
-          </a:p>
-        </p:txBody>
-      </p:sp>
-      <p:sp>
-        <p:nvSpPr>
-          <p:cNvPr id="3" name="Content Placeholder 2"/>
-          <p:cNvSpPr>
-            <a:spLocks noGrp="1"/>
-          </p:cNvSpPr>
-          <p:nvPr>
-            <p:ph idx="1"/>
-          </p:nvPr>
-        </p:nvSpPr>
-        <p:spPr/>
-        <p:txBody>
-          <a:bodyPr/>
-          <a:lstStyle/>
-          <a:p>
-            <a:r>
-              <a:rPr lang="en-US" dirty="0" smtClean="0"/>
-              <a:t>Image and video analysis</a:t>
-            </a:r>
-          </a:p>
-          <a:p>
-            <a:endParaRPr lang="en-US" dirty="0"/>
-          </a:p>
-        </p:txBody>
-      </p:sp>
-      <p:pic>
-        <p:nvPicPr>
-          <p:cNvPr id="5" name="Picture 4"/>
-          <p:cNvPicPr>
-            <a:picLocks noChangeAspect="1"/>
-          </p:cNvPicPr>
-          <p:nvPr/>
-        </p:nvPicPr>
-        <p:blipFill>
-          <a:blip r:embed="rId2">
-            <a:extLst>
-              <a:ext uri="{28A0092B-C50C-407E-A947-70E740481C1C}">
-                <a14:useLocalDpi xmlns:a14="http://schemas.microsoft.com/office/drawing/2010/main" val="0"/>
-              </a:ext>
-            </a:extLst>
-          </a:blip>
-          <a:stretch>
-            <a:fillRect/>
-          </a:stretch>
-        </p:blipFill>
-        <p:spPr>
-          <a:xfrm>
-            <a:off x="2339752" y="2420888"/>
-            <a:ext cx="4666805" cy="4293096"/>
-          </a:xfrm>
-          <a:prstGeom prst="rect">
-            <a:avLst/>
-          </a:prstGeom>
-        </p:spPr>
-      </p:pic>
-    </p:spTree>
-    <p:extLst>
-      <p:ext uri="{BB962C8B-B14F-4D97-AF65-F5344CB8AC3E}">
-        <p14:creationId xmlns:p14="http://schemas.microsoft.com/office/powerpoint/2010/main" val="2796436626"/>
-      </p:ext>
-    </p:extLst>
   </p:cSld>
   <p:clrMapOvr>
     <a:masterClrMapping/>
@@ -7332,10 +6989,10 @@
           <a:lstStyle/>
           <a:p>
             <a:r>
-              <a:rPr lang="de-DE" altLang="en-US" dirty="0" smtClean="0"/>
+              <a:rPr lang="de-DE" altLang="en-US" dirty="0"/>
               <a:t>Stuff to think about... </a:t>
             </a:r>
-            <a:endParaRPr lang="en-GB" altLang="en-US" dirty="0" smtClean="0"/>
+            <a:endParaRPr lang="en-GB" altLang="en-US" dirty="0"/>
           </a:p>
         </p:txBody>
       </p:sp>
@@ -7362,38 +7019,38 @@
           <a:lstStyle/>
           <a:p>
             <a:r>
-              <a:rPr lang="en-GB" altLang="en-US" dirty="0" smtClean="0"/>
+              <a:rPr lang="en-GB" altLang="en-US" dirty="0"/>
               <a:t>What is text?</a:t>
             </a:r>
           </a:p>
           <a:p>
             <a:r>
-              <a:rPr lang="en-GB" altLang="en-US" dirty="0" smtClean="0"/>
+              <a:rPr lang="en-GB" altLang="en-US" dirty="0"/>
               <a:t>What questions can we ask of text?</a:t>
             </a:r>
           </a:p>
           <a:p>
             <a:r>
-              <a:rPr lang="en-GB" altLang="en-US" dirty="0" smtClean="0"/>
+              <a:rPr lang="en-GB" altLang="en-US" dirty="0"/>
               <a:t>Who uses text analysis?</a:t>
             </a:r>
           </a:p>
           <a:p>
             <a:pPr lvl="1"/>
             <a:r>
-              <a:rPr lang="en-GB" altLang="en-US" dirty="0" smtClean="0"/>
+              <a:rPr lang="en-GB" altLang="en-US" dirty="0"/>
               <a:t>What are its applications?</a:t>
             </a:r>
           </a:p>
           <a:p>
             <a:pPr lvl="1"/>
             <a:r>
-              <a:rPr lang="en-GB" altLang="en-US" dirty="0" smtClean="0"/>
+              <a:rPr lang="en-GB" altLang="en-US" dirty="0"/>
               <a:t>What are its limitations?</a:t>
             </a:r>
           </a:p>
           <a:p>
-            <a:endParaRPr lang="en-GB" altLang="en-US" dirty="0" smtClean="0"/>
+            <a:endParaRPr lang="en-GB" altLang="en-US" dirty="0"/>
           </a:p>
         </p:txBody>
       </p:sp>
@@ -7402,13 +7059,6 @@
   <p:clrMapOvr>
     <a:masterClrMapping/>
   </p:clrMapOvr>
-  <p:timing>
-    <p:tnLst>
-      <p:par>
-        <p:cTn xmlns:p14="http://schemas.microsoft.com/office/powerpoint/2010/main" id="1" dur="indefinite" restart="never" nodeType="tmRoot"/>
-      </p:par>
-    </p:tnLst>
-  </p:timing>
 </p:sld>
 </file>
 
@@ -7445,10 +7095,9 @@
           <a:lstStyle/>
           <a:p>
             <a:r>
-              <a:rPr lang="en-US" dirty="0" smtClean="0"/>
+              <a:rPr lang="en-US" dirty="0"/>
               <a:t>What is text analysis?</a:t>
             </a:r>
-            <a:endParaRPr lang="en-US" dirty="0"/>
           </a:p>
         </p:txBody>
       </p:sp>
@@ -7468,47 +7117,21 @@
           <a:lstStyle/>
           <a:p>
             <a:r>
-              <a:rPr lang="en-US" sz="2400" dirty="0" smtClean="0"/>
+              <a:rPr lang="en-US" sz="2400" dirty="0"/>
               <a:t>Text analysis is also known as text mining and text analytics.</a:t>
             </a:r>
           </a:p>
           <a:p>
             <a:r>
               <a:rPr lang="en-US" sz="2400" dirty="0"/>
-              <a:t>Text analysis </a:t>
-            </a:r>
-            <a:r>
-              <a:rPr lang="en-US" sz="2400" dirty="0" smtClean="0"/>
-              <a:t>is </a:t>
-            </a:r>
+              <a:t>Text analysis is the discovery by computer of new, previously unknown information, by automatically extracting information from different written resources. </a:t>
+            </a:r>
+          </a:p>
+          <a:p>
             <a:r>
               <a:rPr lang="en-US" sz="2400" dirty="0"/>
-              <a:t>the discovery by computer of new, previously unknown information, by automatically extracting information from different written resources. </a:t>
-            </a:r>
-            <a:endParaRPr lang="en-US" sz="2400" dirty="0" smtClean="0"/>
-          </a:p>
-          <a:p>
-            <a:r>
-              <a:rPr lang="en-US" sz="2400" dirty="0" smtClean="0"/>
-              <a:t>A </a:t>
-            </a:r>
-            <a:r>
-              <a:rPr lang="en-US" sz="2400" dirty="0"/>
-              <a:t>key element is the linking together of the extracted information </a:t>
-            </a:r>
-            <a:r>
-              <a:rPr lang="en-US" sz="2400" dirty="0" smtClean="0"/>
-              <a:t>to </a:t>
-            </a:r>
-            <a:r>
-              <a:rPr lang="en-US" sz="2400" dirty="0"/>
-              <a:t>form new facts or new hypotheses to be explored further by more conventional means of </a:t>
-            </a:r>
-            <a:r>
-              <a:rPr lang="en-US" sz="2400" dirty="0" smtClean="0"/>
-              <a:t>experimentation and research.</a:t>
-            </a:r>
-            <a:endParaRPr lang="en-US" sz="2400" dirty="0"/>
+              <a:t>A key element is the linking together of the extracted information to form new facts or new hypotheses to be explored further by more conventional means of experimentation and research.</a:t>
+            </a:r>
           </a:p>
         </p:txBody>
       </p:sp>
@@ -7558,10 +7181,9 @@
           <a:lstStyle/>
           <a:p>
             <a:r>
-              <a:rPr lang="en-US" dirty="0" smtClean="0"/>
+              <a:rPr lang="en-US" dirty="0"/>
               <a:t>What is text analysis?</a:t>
             </a:r>
-            <a:endParaRPr lang="en-US" dirty="0"/>
           </a:p>
         </p:txBody>
       </p:sp>
@@ -7582,55 +7204,25 @@
           <a:p>
             <a:r>
               <a:rPr lang="en-US" sz="2400" dirty="0"/>
-              <a:t>Text </a:t>
-            </a:r>
-            <a:r>
-              <a:rPr lang="en-US" sz="2400" dirty="0" smtClean="0"/>
-              <a:t>analysis or mining </a:t>
-            </a:r>
+              <a:t>Text analysis or mining is different from what we're familiar with in web search. </a:t>
+            </a:r>
+          </a:p>
+          <a:p>
             <a:r>
               <a:rPr lang="en-US" sz="2400" dirty="0"/>
-              <a:t>is different from what we're familiar with in web search. </a:t>
-            </a:r>
-            <a:endParaRPr lang="en-US" sz="2400" dirty="0" smtClean="0"/>
-          </a:p>
-          <a:p>
-            <a:r>
-              <a:rPr lang="en-US" sz="2400" dirty="0" smtClean="0"/>
-              <a:t>In a search</a:t>
-            </a:r>
+              <a:t>In a search, the user is typically looking for something that is already known and has been written by someone else. </a:t>
+            </a:r>
+          </a:p>
+          <a:p>
             <a:r>
               <a:rPr lang="en-US" sz="2400" dirty="0"/>
-              <a:t>, the user is typically looking for something that is already known and has been written by someone else. </a:t>
-            </a:r>
-            <a:endParaRPr lang="en-US" sz="2400" dirty="0" smtClean="0"/>
-          </a:p>
-          <a:p>
-            <a:r>
-              <a:rPr lang="en-US" sz="2400" dirty="0" smtClean="0"/>
-              <a:t>The </a:t>
-            </a:r>
+              <a:t>The problem is pushing aside all the material that currently isn't relevant to your needs in order to find the relevant information.</a:t>
+            </a:r>
+          </a:p>
+          <a:p>
             <a:r>
               <a:rPr lang="en-US" sz="2400" dirty="0"/>
-              <a:t>problem is pushing aside all the material that currently isn't relevant to your needs in order to find the relevant information</a:t>
-            </a:r>
-            <a:r>
-              <a:rPr lang="en-US" sz="2400" dirty="0" smtClean="0"/>
-              <a:t>.</a:t>
-            </a:r>
-          </a:p>
-          <a:p>
-            <a:r>
-              <a:rPr lang="en-US" sz="2400" dirty="0"/>
-              <a:t>In text </a:t>
-            </a:r>
-            <a:r>
-              <a:rPr lang="en-US" sz="2400" dirty="0" smtClean="0"/>
-              <a:t>analysis, </a:t>
-            </a:r>
-            <a:r>
-              <a:rPr lang="en-US" sz="2400" dirty="0"/>
-              <a:t>the goal is to discover heretofore unknown information, something that no one yet knows and so could not have yet written down.</a:t>
+              <a:t>In text analysis, the goal is to discover heretofore unknown information, something that no one yet knows and so could not have yet written down.</a:t>
             </a:r>
           </a:p>
         </p:txBody>
@@ -7681,10 +7273,9 @@
           <a:lstStyle/>
           <a:p>
             <a:r>
-              <a:rPr lang="en-US" dirty="0" smtClean="0"/>
+              <a:rPr lang="en-US" dirty="0"/>
               <a:t>Text analysis v. data mining</a:t>
             </a:r>
-            <a:endParaRPr lang="en-US" dirty="0"/>
           </a:p>
         </p:txBody>
       </p:sp>
@@ -7705,80 +7296,19 @@
           <a:p>
             <a:r>
               <a:rPr lang="en-US" sz="2000" dirty="0"/>
-              <a:t>Text </a:t>
-            </a:r>
-            <a:r>
-              <a:rPr lang="en-US" sz="2000" dirty="0" smtClean="0"/>
-              <a:t>analysis is </a:t>
-            </a:r>
+              <a:t>Text analysis is a variation on a field called data mining, which tries to find interesting patterns from large databases. </a:t>
+            </a:r>
+          </a:p>
+          <a:p>
             <a:r>
               <a:rPr lang="en-US" sz="2000" dirty="0"/>
-              <a:t>a variation on a field called data mining, </a:t>
-            </a:r>
-            <a:r>
-              <a:rPr lang="en-US" sz="2000" dirty="0" smtClean="0"/>
-              <a:t>which tries </a:t>
-            </a:r>
+              <a:t>A typical example in data mining is using consumer purchasing patterns to predict which products to place close together on shelves, or to offer coupons for, and so on.  For example, if you buy a flashlight, you are likely to buy batteries along with it.  </a:t>
+            </a:r>
+          </a:p>
+          <a:p>
             <a:r>
               <a:rPr lang="en-US" sz="2000" dirty="0"/>
-              <a:t>to find interesting patterns from large databases. </a:t>
-            </a:r>
-            <a:endParaRPr lang="en-US" sz="2000" dirty="0" smtClean="0"/>
-          </a:p>
-          <a:p>
-            <a:r>
-              <a:rPr lang="en-US" sz="2000" dirty="0" smtClean="0"/>
-              <a:t>A </a:t>
-            </a:r>
-            <a:r>
-              <a:rPr lang="en-US" sz="2000" dirty="0"/>
-              <a:t>typical example in data mining is using consumer purchasing patterns to predict which products to place close together on shelves, or to offer coupons for, and so on. </a:t>
-            </a:r>
-            <a:r>
-              <a:rPr lang="en-US" sz="2000" dirty="0" smtClean="0"/>
-              <a:t> For </a:t>
-            </a:r>
-            <a:r>
-              <a:rPr lang="en-US" sz="2000" dirty="0"/>
-              <a:t>example, if you buy a flashlight, you are likely to buy batteries along with it. </a:t>
-            </a:r>
-            <a:r>
-              <a:rPr lang="en-US" sz="2000" dirty="0" smtClean="0"/>
-              <a:t> </a:t>
-            </a:r>
-          </a:p>
-          <a:p>
-            <a:r>
-              <a:rPr lang="en-US" sz="2000" dirty="0" smtClean="0"/>
-              <a:t>A </a:t>
-            </a:r>
-            <a:r>
-              <a:rPr lang="en-US" sz="2000" dirty="0"/>
-              <a:t>related application is automatic detection of fraud, such as in credit card usage. </a:t>
-            </a:r>
-            <a:r>
-              <a:rPr lang="en-US" sz="2000" dirty="0" smtClean="0"/>
-              <a:t> Analysts </a:t>
-            </a:r>
-            <a:r>
-              <a:rPr lang="en-US" sz="2000" dirty="0"/>
-              <a:t>look across huge numbers of credit card records to find deviations from normal spending patterns. </a:t>
-            </a:r>
-            <a:r>
-              <a:rPr lang="en-US" sz="2000" dirty="0" smtClean="0"/>
-              <a:t> A </a:t>
-            </a:r>
-            <a:r>
-              <a:rPr lang="en-US" sz="2000" dirty="0"/>
-              <a:t>classic example is the use of a credit card to buy a small amount of gasoline followed by an overseas plane flight. </a:t>
-            </a:r>
-            <a:r>
-              <a:rPr lang="en-US" sz="2000" dirty="0" smtClean="0"/>
-              <a:t> The </a:t>
-            </a:r>
-            <a:r>
-              <a:rPr lang="en-US" sz="2000" dirty="0"/>
-              <a:t>claim is that the first purchase tests the card to be sure it is active.</a:t>
+              <a:t>A related application is automatic detection of fraud, such as in credit card usage.  Analysts look across huge numbers of credit card records to find deviations from normal spending patterns.  A classic example is the use of a credit card to buy a small amount of gasoline followed by an overseas plane flight.  The claim is that the first purchase tests the card to be sure it is active.</a:t>
             </a:r>
           </a:p>
         </p:txBody>
@@ -7854,48 +7384,11 @@
               <a:rPr lang="en-US" sz="2400" dirty="0"/>
               <a:t>The difference between regular data mining and text mining is that in text mining the patterns are extracted from natural language text rather than from structured databases of facts. </a:t>
             </a:r>
-            <a:endParaRPr lang="en-US" sz="2400" dirty="0" smtClean="0"/>
-          </a:p>
-          <a:p>
-            <a:r>
-              <a:rPr lang="en-US" sz="2400" dirty="0" smtClean="0"/>
-              <a:t>Databases </a:t>
-            </a:r>
+          </a:p>
+          <a:p>
             <a:r>
               <a:rPr lang="en-US" sz="2400" dirty="0"/>
-              <a:t>are designed for programs to process automatically; text is written for people to read</a:t>
-            </a:r>
-            <a:r>
-              <a:rPr lang="en-US" sz="2400" dirty="0" smtClean="0"/>
-              <a:t>.  </a:t>
-            </a:r>
-            <a:r>
-              <a:rPr lang="en-US" sz="2400" dirty="0"/>
-              <a:t>We do not have programs that can "read" text and will not have such for the </a:t>
-            </a:r>
-            <a:r>
-              <a:rPr lang="en-US" sz="2400" dirty="0" smtClean="0"/>
-              <a:t>foreseeable </a:t>
-            </a:r>
-            <a:r>
-              <a:rPr lang="en-US" sz="2400" dirty="0"/>
-              <a:t>future. </a:t>
-            </a:r>
-            <a:r>
-              <a:rPr lang="en-US" sz="2400" dirty="0" smtClean="0"/>
-              <a:t> Many </a:t>
-            </a:r>
-            <a:r>
-              <a:rPr lang="en-US" sz="2400" dirty="0"/>
-              <a:t>researchers think it will require a full simulation of how the mind works before we can write programs that read </a:t>
-            </a:r>
-            <a:r>
-              <a:rPr lang="en-US" sz="2400" dirty="0" smtClean="0"/>
-              <a:t>and interpret text the </a:t>
-            </a:r>
-            <a:r>
-              <a:rPr lang="en-US" sz="2400" dirty="0"/>
-              <a:t>way people do.</a:t>
+              <a:t>Databases are designed for programs to process automatically; text is written for people to read.  We do not have programs that can "read" text and will not have such for the foreseeable future.  Many researchers think it will require a full simulation of how the mind works before we can write programs that read and interpret text the way people do.</a:t>
             </a:r>
           </a:p>
         </p:txBody>
@@ -7946,12 +7439,8 @@
           <a:lstStyle/>
           <a:p>
             <a:r>
-              <a:rPr lang="en-US" dirty="0" smtClean="0"/>
-              <a:t>Computational </a:t>
-            </a:r>
-            <a:r>
               <a:rPr lang="en-US" dirty="0"/>
-              <a:t>linguistics</a:t>
+              <a:t>Computational linguistics</a:t>
             </a:r>
           </a:p>
         </p:txBody>
@@ -7980,47 +7469,21 @@
               <a:rPr lang="en-US" sz="2300" dirty="0"/>
               <a:t>However, there is a field called computational linguistics (also known as natural language processing) which is making a lot of progress in doing small subtasks in text analysis. </a:t>
             </a:r>
-            <a:endParaRPr lang="en-US" sz="2300" dirty="0" smtClean="0"/>
-          </a:p>
-          <a:p>
-            <a:r>
-              <a:rPr lang="en-US" sz="2300" dirty="0" smtClean="0"/>
-              <a:t>For </a:t>
-            </a:r>
+          </a:p>
+          <a:p>
             <a:r>
               <a:rPr lang="en-US" sz="2300" dirty="0"/>
-              <a:t>example, it is relatively easy to write a program to extract phrases from an article or book that, when shown to a human reader, seem to summarize its contents. </a:t>
-            </a:r>
-            <a:endParaRPr lang="en-US" sz="2300" dirty="0" smtClean="0"/>
-          </a:p>
-          <a:p>
-            <a:r>
-              <a:rPr lang="en-US" sz="2300" dirty="0" smtClean="0"/>
-              <a:t>(</a:t>
-            </a:r>
+              <a:t>For example, it is relatively easy to write a program to extract phrases from an article or book that, when shown to a human reader, seem to summarize its contents. </a:t>
+            </a:r>
+          </a:p>
+          <a:p>
             <a:r>
               <a:rPr lang="en-US" sz="2300" dirty="0"/>
-              <a:t>The most frequent words and phrases in this </a:t>
-            </a:r>
-            <a:r>
-              <a:rPr lang="en-US" sz="2300" dirty="0" smtClean="0"/>
-              <a:t>PowerPoint, </a:t>
-            </a:r>
-            <a:r>
-              <a:rPr lang="en-US" sz="2300" dirty="0"/>
-              <a:t>minus the really common words like "the" are: </a:t>
+              <a:t>(The most frequent words and phrases in this PowerPoint, minus the really common words like "the" are: </a:t>
             </a:r>
             <a:r>
               <a:rPr lang="en-US" sz="2300" i="1" dirty="0"/>
-              <a:t>text </a:t>
-            </a:r>
-            <a:r>
-              <a:rPr lang="en-US" sz="2300" i="1" dirty="0" smtClean="0"/>
-              <a:t>analysis, </a:t>
-            </a:r>
-            <a:r>
-              <a:rPr lang="en-US" sz="2300" i="1" dirty="0"/>
-              <a:t>information, programs,</a:t>
+              <a:t>text analysis, information, programs,</a:t>
             </a:r>
             <a:r>
               <a:rPr lang="en-US" sz="2300" dirty="0"/>
@@ -8083,10 +7546,9 @@
           <a:lstStyle/>
           <a:p>
             <a:r>
-              <a:rPr lang="en-US" dirty="0" smtClean="0"/>
+              <a:rPr lang="en-US" dirty="0"/>
               <a:t>Text extraction</a:t>
             </a:r>
-            <a:endParaRPr lang="en-US" dirty="0"/>
           </a:p>
         </p:txBody>
       </p:sp>
@@ -8107,53 +7569,13 @@
           <a:p>
             <a:r>
               <a:rPr lang="en-US" sz="2400" dirty="0"/>
-              <a:t>There are programs that can, with reasonable accuracy, extract information from text with somewhat regularized structure</a:t>
-            </a:r>
-            <a:r>
-              <a:rPr lang="en-US" sz="2400" dirty="0" smtClean="0"/>
-              <a:t>.  </a:t>
-            </a:r>
+              <a:t>There are programs that can, with reasonable accuracy, extract information from text with somewhat regularized structure.  For example, programs that read resumes and extract out people's names, addresses, job skills, and so on, can get accuracies from 80 to 90% or better.  </a:t>
+            </a:r>
+          </a:p>
+          <a:p>
             <a:r>
               <a:rPr lang="en-US" sz="2400" dirty="0"/>
-              <a:t>For example, programs that read </a:t>
-            </a:r>
-            <a:r>
-              <a:rPr lang="en-US" sz="2400" dirty="0" smtClean="0"/>
-              <a:t>resumes </a:t>
-            </a:r>
-            <a:r>
-              <a:rPr lang="en-US" sz="2400" dirty="0"/>
-              <a:t>and extract out people's names, addresses, job skills, and so on, </a:t>
-            </a:r>
-            <a:r>
-              <a:rPr lang="en-US" sz="2400" dirty="0" smtClean="0"/>
-              <a:t>can </a:t>
-            </a:r>
-            <a:r>
-              <a:rPr lang="en-US" sz="2400" dirty="0"/>
-              <a:t>get accuracies </a:t>
-            </a:r>
-            <a:r>
-              <a:rPr lang="en-US" sz="2400" dirty="0" smtClean="0"/>
-              <a:t>from 80 to 90% or better.  </a:t>
-            </a:r>
-          </a:p>
-          <a:p>
-            <a:r>
-              <a:rPr lang="en-US" sz="2400" dirty="0" smtClean="0"/>
-              <a:t>This is really information extraction, not text analysis. True text analysis </a:t>
-            </a:r>
-            <a:r>
-              <a:rPr lang="en-US" sz="2400" dirty="0"/>
-              <a:t>discovers new pieces of knowledge, </a:t>
-            </a:r>
-            <a:r>
-              <a:rPr lang="en-US" sz="2400" dirty="0" smtClean="0"/>
-              <a:t>using </a:t>
-            </a:r>
-            <a:r>
-              <a:rPr lang="en-US" sz="2400" dirty="0"/>
-              <a:t>approaches that find overall trends in textual data.</a:t>
+              <a:t>This is really information extraction, not text analysis. True text analysis discovers new pieces of knowledge, using approaches that find overall trends in textual data.</a:t>
             </a:r>
           </a:p>
         </p:txBody>
@@ -8204,10 +7626,9 @@
           <a:lstStyle/>
           <a:p>
             <a:r>
-              <a:rPr lang="en-US" dirty="0" smtClean="0"/>
+              <a:rPr lang="en-US" dirty="0"/>
               <a:t>Text analysis v. extraction</a:t>
             </a:r>
-            <a:endParaRPr lang="en-US" dirty="0"/>
           </a:p>
         </p:txBody>
       </p:sp>
@@ -8228,45 +7649,13 @@
           <a:p>
             <a:r>
               <a:rPr lang="en-US" sz="2200" dirty="0"/>
-              <a:t>An analogy I like to use comes from the realm of crime fighting. </a:t>
-            </a:r>
-            <a:r>
-              <a:rPr lang="en-US" sz="2200" dirty="0" smtClean="0"/>
-              <a:t> I </a:t>
-            </a:r>
+              <a:t>An analogy I like to use comes from the realm of crime fighting.  I think discovering new knowledge vs. showing trends is like the difference between a detective following clues to find the criminal vs. analysts looking at crime statistics to assess overall trends in car theft.</a:t>
+            </a:r>
+          </a:p>
+          <a:p>
             <a:r>
               <a:rPr lang="en-US" sz="2200" dirty="0"/>
-              <a:t>think discovering new knowledge vs. showing trends is like the difference between a detective following clues to find the criminal vs. analysts looking at crime statistics to assess overall trends in car theft.</a:t>
-            </a:r>
-          </a:p>
-          <a:p>
-            <a:r>
-              <a:rPr lang="en-US" sz="2200" dirty="0"/>
-              <a:t>People are using the output of such programs to try to link together information in interesting ways. </a:t>
-            </a:r>
-            <a:r>
-              <a:rPr lang="en-US" sz="2200" dirty="0" smtClean="0"/>
-              <a:t> For </a:t>
-            </a:r>
-            <a:r>
-              <a:rPr lang="en-US" sz="2200" dirty="0"/>
-              <a:t>example, one can extract all the names of people and companies that occur in </a:t>
-            </a:r>
-            <a:r>
-              <a:rPr lang="en-US" sz="2200" dirty="0" smtClean="0"/>
-              <a:t>text-based news (e.g. newspapers, blogs, websites, etc.) surrounding </a:t>
-            </a:r>
-            <a:r>
-              <a:rPr lang="en-US" sz="2200" dirty="0"/>
-              <a:t>the topic of wireless technology to try to infer who the players are in that field</a:t>
-            </a:r>
-            <a:r>
-              <a:rPr lang="en-US" sz="2200" dirty="0" smtClean="0"/>
-              <a:t>.  </a:t>
-            </a:r>
-            <a:r>
-              <a:rPr lang="en-US" sz="2200" dirty="0"/>
-              <a:t>There are a number of companies that are investigating this kind of application.</a:t>
+              <a:t>People are using the output of such programs to try to link together information in interesting ways.  For example, one can extract all the names of people and companies that occur in text-based news (e.g. newspapers, blogs, websites, etc.) surrounding the topic of wireless technology to try to infer who the players are in that field.  There are a number of companies that are investigating this kind of application.</a:t>
             </a:r>
           </a:p>
           <a:p>

</xml_diff>